<commit_message>
Edited parts of UGDG and diagrams.
</commit_message>
<xml_diff>
--- a/docs/diagrams/EditEventSequenceDiagram.pptx
+++ b/docs/diagrams/EditEventSequenceDiagram.pptx
@@ -208,7 +208,7 @@
           <a:p>
             <a:fld id="{F5CC4B3F-88C1-4FFA-B1B6-F41C21DC6924}" type="datetimeFigureOut">
               <a:rPr lang="en-US" smtClean="0"/>
-              <a:t>11/11/2018</a:t>
+              <a:t>11/12/2018</a:t>
             </a:fld>
             <a:endParaRPr lang="en-US"/>
           </a:p>
@@ -654,7 +654,7 @@
           <a:p>
             <a:fld id="{78C97017-6FC3-485B-9764-EAC9E56C1D49}" type="datetimeFigureOut">
               <a:rPr lang="en-US" smtClean="0"/>
-              <a:t>11/11/2018</a:t>
+              <a:t>11/12/2018</a:t>
             </a:fld>
             <a:endParaRPr lang="en-US"/>
           </a:p>
@@ -822,7 +822,7 @@
           <a:p>
             <a:fld id="{78C97017-6FC3-485B-9764-EAC9E56C1D49}" type="datetimeFigureOut">
               <a:rPr lang="en-US" smtClean="0"/>
-              <a:t>11/11/2018</a:t>
+              <a:t>11/12/2018</a:t>
             </a:fld>
             <a:endParaRPr lang="en-US"/>
           </a:p>
@@ -1000,7 +1000,7 @@
           <a:p>
             <a:fld id="{78C97017-6FC3-485B-9764-EAC9E56C1D49}" type="datetimeFigureOut">
               <a:rPr lang="en-US" smtClean="0"/>
-              <a:t>11/11/2018</a:t>
+              <a:t>11/12/2018</a:t>
             </a:fld>
             <a:endParaRPr lang="en-US"/>
           </a:p>
@@ -1168,7 +1168,7 @@
           <a:p>
             <a:fld id="{78C97017-6FC3-485B-9764-EAC9E56C1D49}" type="datetimeFigureOut">
               <a:rPr lang="en-US" smtClean="0"/>
-              <a:t>11/11/2018</a:t>
+              <a:t>11/12/2018</a:t>
             </a:fld>
             <a:endParaRPr lang="en-US"/>
           </a:p>
@@ -1413,7 +1413,7 @@
           <a:p>
             <a:fld id="{78C97017-6FC3-485B-9764-EAC9E56C1D49}" type="datetimeFigureOut">
               <a:rPr lang="en-US" smtClean="0"/>
-              <a:t>11/11/2018</a:t>
+              <a:t>11/12/2018</a:t>
             </a:fld>
             <a:endParaRPr lang="en-US"/>
           </a:p>
@@ -1698,7 +1698,7 @@
           <a:p>
             <a:fld id="{78C97017-6FC3-485B-9764-EAC9E56C1D49}" type="datetimeFigureOut">
               <a:rPr lang="en-US" smtClean="0"/>
-              <a:t>11/11/2018</a:t>
+              <a:t>11/12/2018</a:t>
             </a:fld>
             <a:endParaRPr lang="en-US"/>
           </a:p>
@@ -2117,7 +2117,7 @@
           <a:p>
             <a:fld id="{78C97017-6FC3-485B-9764-EAC9E56C1D49}" type="datetimeFigureOut">
               <a:rPr lang="en-US" smtClean="0"/>
-              <a:t>11/11/2018</a:t>
+              <a:t>11/12/2018</a:t>
             </a:fld>
             <a:endParaRPr lang="en-US"/>
           </a:p>
@@ -2234,7 +2234,7 @@
           <a:p>
             <a:fld id="{78C97017-6FC3-485B-9764-EAC9E56C1D49}" type="datetimeFigureOut">
               <a:rPr lang="en-US" smtClean="0"/>
-              <a:t>11/11/2018</a:t>
+              <a:t>11/12/2018</a:t>
             </a:fld>
             <a:endParaRPr lang="en-US"/>
           </a:p>
@@ -2329,7 +2329,7 @@
           <a:p>
             <a:fld id="{78C97017-6FC3-485B-9764-EAC9E56C1D49}" type="datetimeFigureOut">
               <a:rPr lang="en-US" smtClean="0"/>
-              <a:t>11/11/2018</a:t>
+              <a:t>11/12/2018</a:t>
             </a:fld>
             <a:endParaRPr lang="en-US"/>
           </a:p>
@@ -2604,7 +2604,7 @@
           <a:p>
             <a:fld id="{78C97017-6FC3-485B-9764-EAC9E56C1D49}" type="datetimeFigureOut">
               <a:rPr lang="en-US" smtClean="0"/>
-              <a:t>11/11/2018</a:t>
+              <a:t>11/12/2018</a:t>
             </a:fld>
             <a:endParaRPr lang="en-US"/>
           </a:p>
@@ -2856,7 +2856,7 @@
           <a:p>
             <a:fld id="{78C97017-6FC3-485B-9764-EAC9E56C1D49}" type="datetimeFigureOut">
               <a:rPr lang="en-US" smtClean="0"/>
-              <a:t>11/11/2018</a:t>
+              <a:t>11/12/2018</a:t>
             </a:fld>
             <a:endParaRPr lang="en-US"/>
           </a:p>
@@ -3067,7 +3067,7 @@
           <a:p>
             <a:fld id="{78C97017-6FC3-485B-9764-EAC9E56C1D49}" type="datetimeFigureOut">
               <a:rPr lang="en-US" smtClean="0"/>
-              <a:t>11/11/2018</a:t>
+              <a:t>11/12/2018</a:t>
             </a:fld>
             <a:endParaRPr lang="en-US"/>
           </a:p>
@@ -4650,7 +4650,7 @@
             <a:p>
               <a:r>
                 <a:rPr lang="en-US" dirty="0"/>
-                <a:t>a</a:t>
+                <a:t>e</a:t>
               </a:r>
             </a:p>
           </p:txBody>

</xml_diff>